<commit_message>
This class makes me sad
</commit_message>
<xml_diff>
--- a/HK_Bank_notes.pptx
+++ b/HK_Bank_notes.pptx
@@ -262,7 +262,7 @@
           <a:p>
             <a:fld id="{C382D0F4-23C0-408A-987B-6E04B7954CEE}" type="datetimeFigureOut">
               <a:rPr lang="en-US" smtClean="0"/>
-              <a:t>12/2/2017</a:t>
+              <a:t>12/4/2017</a:t>
             </a:fld>
             <a:endParaRPr lang="en-US"/>
           </a:p>
@@ -1498,7 +1498,7 @@
           <a:p>
             <a:fld id="{1B0D7840-AF73-495E-B674-C4E8BD3769FA}" type="datetimeFigureOut">
               <a:rPr lang="en-US" smtClean="0"/>
-              <a:t>12/2/2017</a:t>
+              <a:t>12/4/2017</a:t>
             </a:fld>
             <a:endParaRPr lang="en-US"/>
           </a:p>
@@ -1666,7 +1666,7 @@
           <a:p>
             <a:fld id="{1B0D7840-AF73-495E-B674-C4E8BD3769FA}" type="datetimeFigureOut">
               <a:rPr lang="en-US" smtClean="0"/>
-              <a:t>12/2/2017</a:t>
+              <a:t>12/4/2017</a:t>
             </a:fld>
             <a:endParaRPr lang="en-US"/>
           </a:p>
@@ -1844,7 +1844,7 @@
           <a:p>
             <a:fld id="{1B0D7840-AF73-495E-B674-C4E8BD3769FA}" type="datetimeFigureOut">
               <a:rPr lang="en-US" smtClean="0"/>
-              <a:t>12/2/2017</a:t>
+              <a:t>12/4/2017</a:t>
             </a:fld>
             <a:endParaRPr lang="en-US"/>
           </a:p>
@@ -2012,7 +2012,7 @@
           <a:p>
             <a:fld id="{1B0D7840-AF73-495E-B674-C4E8BD3769FA}" type="datetimeFigureOut">
               <a:rPr lang="en-US" smtClean="0"/>
-              <a:t>12/2/2017</a:t>
+              <a:t>12/4/2017</a:t>
             </a:fld>
             <a:endParaRPr lang="en-US"/>
           </a:p>
@@ -2257,7 +2257,7 @@
           <a:p>
             <a:fld id="{1B0D7840-AF73-495E-B674-C4E8BD3769FA}" type="datetimeFigureOut">
               <a:rPr lang="en-US" smtClean="0"/>
-              <a:t>12/2/2017</a:t>
+              <a:t>12/4/2017</a:t>
             </a:fld>
             <a:endParaRPr lang="en-US"/>
           </a:p>
@@ -2486,7 +2486,7 @@
           <a:p>
             <a:fld id="{1B0D7840-AF73-495E-B674-C4E8BD3769FA}" type="datetimeFigureOut">
               <a:rPr lang="en-US" smtClean="0"/>
-              <a:t>12/2/2017</a:t>
+              <a:t>12/4/2017</a:t>
             </a:fld>
             <a:endParaRPr lang="en-US"/>
           </a:p>
@@ -2850,7 +2850,7 @@
           <a:p>
             <a:fld id="{1B0D7840-AF73-495E-B674-C4E8BD3769FA}" type="datetimeFigureOut">
               <a:rPr lang="en-US" smtClean="0"/>
-              <a:t>12/2/2017</a:t>
+              <a:t>12/4/2017</a:t>
             </a:fld>
             <a:endParaRPr lang="en-US"/>
           </a:p>
@@ -2967,7 +2967,7 @@
           <a:p>
             <a:fld id="{1B0D7840-AF73-495E-B674-C4E8BD3769FA}" type="datetimeFigureOut">
               <a:rPr lang="en-US" smtClean="0"/>
-              <a:t>12/2/2017</a:t>
+              <a:t>12/4/2017</a:t>
             </a:fld>
             <a:endParaRPr lang="en-US"/>
           </a:p>
@@ -3062,7 +3062,7 @@
           <a:p>
             <a:fld id="{1B0D7840-AF73-495E-B674-C4E8BD3769FA}" type="datetimeFigureOut">
               <a:rPr lang="en-US" smtClean="0"/>
-              <a:t>12/2/2017</a:t>
+              <a:t>12/4/2017</a:t>
             </a:fld>
             <a:endParaRPr lang="en-US"/>
           </a:p>
@@ -3337,7 +3337,7 @@
           <a:p>
             <a:fld id="{1B0D7840-AF73-495E-B674-C4E8BD3769FA}" type="datetimeFigureOut">
               <a:rPr lang="en-US" smtClean="0"/>
-              <a:t>12/2/2017</a:t>
+              <a:t>12/4/2017</a:t>
             </a:fld>
             <a:endParaRPr lang="en-US"/>
           </a:p>
@@ -3589,7 +3589,7 @@
           <a:p>
             <a:fld id="{1B0D7840-AF73-495E-B674-C4E8BD3769FA}" type="datetimeFigureOut">
               <a:rPr lang="en-US" smtClean="0"/>
-              <a:t>12/2/2017</a:t>
+              <a:t>12/4/2017</a:t>
             </a:fld>
             <a:endParaRPr lang="en-US"/>
           </a:p>
@@ -3803,7 +3803,7 @@
           <a:p>
             <a:fld id="{1B0D7840-AF73-495E-B674-C4E8BD3769FA}" type="datetimeFigureOut">
               <a:rPr lang="en-US" smtClean="0"/>
-              <a:t>12/2/2017</a:t>
+              <a:t>12/4/2017</a:t>
             </a:fld>
             <a:endParaRPr lang="en-US"/>
           </a:p>
@@ -5011,13 +5011,6 @@
               </a:rPr>
               <a:t>	</a:t>
             </a:r>
-            <a:endParaRPr lang="en-US" sz="5400" b="1" dirty="0" smtClean="0">
-              <a:solidFill>
-                <a:srgbClr val="BC0000"/>
-              </a:solidFill>
-              <a:latin typeface="Times New Roman" panose="02020603050405020304" pitchFamily="18" charset="0"/>
-              <a:cs typeface="Times New Roman" panose="02020603050405020304" pitchFamily="18" charset="0"/>
-            </a:endParaRPr>
           </a:p>
           <a:p>
             <a:pPr algn="ctr"/>
@@ -5314,13 +5307,6 @@
               </a:rPr>
               <a:t>	</a:t>
             </a:r>
-            <a:endParaRPr lang="en-US" sz="5400" b="1" dirty="0" smtClean="0">
-              <a:solidFill>
-                <a:srgbClr val="BC0000"/>
-              </a:solidFill>
-              <a:latin typeface="Times New Roman" panose="02020603050405020304" pitchFamily="18" charset="0"/>
-              <a:cs typeface="Times New Roman" panose="02020603050405020304" pitchFamily="18" charset="0"/>
-            </a:endParaRPr>
           </a:p>
           <a:p>
             <a:pPr algn="ctr"/>
@@ -5904,13 +5890,6 @@
               </a:rPr>
               <a:t>	</a:t>
             </a:r>
-            <a:endParaRPr lang="en-US" sz="5400" b="1" dirty="0" smtClean="0">
-              <a:solidFill>
-                <a:srgbClr val="BC0000"/>
-              </a:solidFill>
-              <a:latin typeface="Times New Roman" panose="02020603050405020304" pitchFamily="18" charset="0"/>
-              <a:cs typeface="Times New Roman" panose="02020603050405020304" pitchFamily="18" charset="0"/>
-            </a:endParaRPr>
           </a:p>
           <a:p>
             <a:pPr algn="ctr"/>
@@ -6496,13 +6475,6 @@
               </a:rPr>
               <a:t>	</a:t>
             </a:r>
-            <a:endParaRPr lang="en-US" sz="5400" b="1" dirty="0" smtClean="0">
-              <a:solidFill>
-                <a:srgbClr val="BC0000"/>
-              </a:solidFill>
-              <a:latin typeface="Times New Roman" panose="02020603050405020304" pitchFamily="18" charset="0"/>
-              <a:cs typeface="Times New Roman" panose="02020603050405020304" pitchFamily="18" charset="0"/>
-            </a:endParaRPr>
           </a:p>
           <a:p>
             <a:pPr algn="ctr"/>
@@ -7058,13 +7030,6 @@
               </a:rPr>
               <a:t>	</a:t>
             </a:r>
-            <a:endParaRPr lang="en-US" sz="5400" b="1" dirty="0" smtClean="0">
-              <a:solidFill>
-                <a:srgbClr val="BC0000"/>
-              </a:solidFill>
-              <a:latin typeface="Times New Roman" panose="02020603050405020304" pitchFamily="18" charset="0"/>
-              <a:cs typeface="Times New Roman" panose="02020603050405020304" pitchFamily="18" charset="0"/>
-            </a:endParaRPr>
           </a:p>
           <a:p>
             <a:pPr algn="ctr"/>

</xml_diff>

<commit_message>
Updated README.md, ppt for Friday, and Workflow.
</commit_message>
<xml_diff>
--- a/HK_Bank_notes.pptx
+++ b/HK_Bank_notes.pptx
@@ -138,7 +138,7 @@
       </p14:sectionLst>
     </p:ext>
     <p:ext uri="{EFAFB233-063F-42B5-8137-9DF3F51BA10A}">
-      <p15:sldGuideLst xmlns:p15="http://schemas.microsoft.com/office/powerpoint/2012/main" xmlns="">
+      <p15:sldGuideLst xmlns:p15="http://schemas.microsoft.com/office/powerpoint/2012/main">
         <p15:guide id="1" orient="horz" pos="2160" userDrawn="1">
           <p15:clr>
             <a:srgbClr val="A4A3A4"/>
@@ -252,7 +252,7 @@
           <a:p>
             <a:fld id="{C382D0F4-23C0-408A-987B-6E04B7954CEE}" type="datetimeFigureOut">
               <a:rPr lang="en-US" smtClean="0"/>
-              <a:t>12/7/17</a:t>
+              <a:t>12/8/17</a:t>
             </a:fld>
             <a:endParaRPr lang="en-US"/>
           </a:p>
@@ -1409,7 +1409,7 @@
           <a:p>
             <a:fld id="{1B0D7840-AF73-495E-B674-C4E8BD3769FA}" type="datetimeFigureOut">
               <a:rPr lang="en-US" smtClean="0"/>
-              <a:t>12/7/17</a:t>
+              <a:t>12/8/17</a:t>
             </a:fld>
             <a:endParaRPr lang="en-US"/>
           </a:p>
@@ -1660,7 +1660,7 @@
           <a:p>
             <a:fld id="{1B0D7840-AF73-495E-B674-C4E8BD3769FA}" type="datetimeFigureOut">
               <a:rPr lang="en-US" smtClean="0"/>
-              <a:t>12/7/17</a:t>
+              <a:t>12/8/17</a:t>
             </a:fld>
             <a:endParaRPr lang="en-US"/>
           </a:p>
@@ -1974,7 +1974,7 @@
           <a:p>
             <a:fld id="{1B0D7840-AF73-495E-B674-C4E8BD3769FA}" type="datetimeFigureOut">
               <a:rPr lang="en-US" smtClean="0"/>
-              <a:t>12/7/17</a:t>
+              <a:t>12/8/17</a:t>
             </a:fld>
             <a:endParaRPr lang="en-US"/>
           </a:p>
@@ -2315,7 +2315,7 @@
           <a:p>
             <a:fld id="{1B0D7840-AF73-495E-B674-C4E8BD3769FA}" type="datetimeFigureOut">
               <a:rPr lang="en-US" smtClean="0"/>
-              <a:t>12/7/17</a:t>
+              <a:t>12/8/17</a:t>
             </a:fld>
             <a:endParaRPr lang="en-US"/>
           </a:p>
@@ -2629,7 +2629,7 @@
           <a:p>
             <a:fld id="{1B0D7840-AF73-495E-B674-C4E8BD3769FA}" type="datetimeFigureOut">
               <a:rPr lang="en-US" smtClean="0"/>
-              <a:t>12/7/17</a:t>
+              <a:t>12/8/17</a:t>
             </a:fld>
             <a:endParaRPr lang="en-US"/>
           </a:p>
@@ -3022,7 +3022,7 @@
           <a:p>
             <a:fld id="{1B0D7840-AF73-495E-B674-C4E8BD3769FA}" type="datetimeFigureOut">
               <a:rPr lang="en-US" smtClean="0"/>
-              <a:t>12/7/17</a:t>
+              <a:t>12/8/17</a:t>
             </a:fld>
             <a:endParaRPr lang="en-US"/>
           </a:p>
@@ -3192,7 +3192,7 @@
           <a:p>
             <a:fld id="{1B0D7840-AF73-495E-B674-C4E8BD3769FA}" type="datetimeFigureOut">
               <a:rPr lang="en-US" smtClean="0"/>
-              <a:t>12/7/17</a:t>
+              <a:t>12/8/17</a:t>
             </a:fld>
             <a:endParaRPr lang="en-US"/>
           </a:p>
@@ -3372,7 +3372,7 @@
           <a:p>
             <a:fld id="{1B0D7840-AF73-495E-B674-C4E8BD3769FA}" type="datetimeFigureOut">
               <a:rPr lang="en-US" smtClean="0"/>
-              <a:t>12/7/17</a:t>
+              <a:t>12/8/17</a:t>
             </a:fld>
             <a:endParaRPr lang="en-US"/>
           </a:p>
@@ -3548,7 +3548,7 @@
           <a:p>
             <a:fld id="{1B0D7840-AF73-495E-B674-C4E8BD3769FA}" type="datetimeFigureOut">
               <a:rPr lang="en-US" smtClean="0"/>
-              <a:t>12/7/17</a:t>
+              <a:t>12/8/17</a:t>
             </a:fld>
             <a:endParaRPr lang="en-US"/>
           </a:p>
@@ -3795,7 +3795,7 @@
           <a:p>
             <a:fld id="{1B0D7840-AF73-495E-B674-C4E8BD3769FA}" type="datetimeFigureOut">
               <a:rPr lang="en-US" smtClean="0"/>
-              <a:t>12/7/17</a:t>
+              <a:t>12/8/17</a:t>
             </a:fld>
             <a:endParaRPr lang="en-US"/>
           </a:p>
@@ -4027,7 +4027,7 @@
           <a:p>
             <a:fld id="{1B0D7840-AF73-495E-B674-C4E8BD3769FA}" type="datetimeFigureOut">
               <a:rPr lang="en-US" smtClean="0"/>
-              <a:t>12/7/17</a:t>
+              <a:t>12/8/17</a:t>
             </a:fld>
             <a:endParaRPr lang="en-US"/>
           </a:p>
@@ -4401,7 +4401,7 @@
           <a:p>
             <a:fld id="{1B0D7840-AF73-495E-B674-C4E8BD3769FA}" type="datetimeFigureOut">
               <a:rPr lang="en-US" smtClean="0"/>
-              <a:t>12/7/17</a:t>
+              <a:t>12/8/17</a:t>
             </a:fld>
             <a:endParaRPr lang="en-US"/>
           </a:p>
@@ -4524,7 +4524,7 @@
           <a:p>
             <a:fld id="{1B0D7840-AF73-495E-B674-C4E8BD3769FA}" type="datetimeFigureOut">
               <a:rPr lang="en-US" smtClean="0"/>
-              <a:t>12/7/17</a:t>
+              <a:t>12/8/17</a:t>
             </a:fld>
             <a:endParaRPr lang="en-US"/>
           </a:p>
@@ -4619,7 +4619,7 @@
           <a:p>
             <a:fld id="{1B0D7840-AF73-495E-B674-C4E8BD3769FA}" type="datetimeFigureOut">
               <a:rPr lang="en-US" smtClean="0"/>
-              <a:t>12/7/17</a:t>
+              <a:t>12/8/17</a:t>
             </a:fld>
             <a:endParaRPr lang="en-US"/>
           </a:p>
@@ -4874,7 +4874,7 @@
           <a:p>
             <a:fld id="{1B0D7840-AF73-495E-B674-C4E8BD3769FA}" type="datetimeFigureOut">
               <a:rPr lang="en-US" smtClean="0"/>
-              <a:t>12/7/17</a:t>
+              <a:t>12/8/17</a:t>
             </a:fld>
             <a:endParaRPr lang="en-US"/>
           </a:p>
@@ -5137,7 +5137,7 @@
           <a:p>
             <a:fld id="{1B0D7840-AF73-495E-B674-C4E8BD3769FA}" type="datetimeFigureOut">
               <a:rPr lang="en-US" smtClean="0"/>
-              <a:t>12/7/17</a:t>
+              <a:t>12/8/17</a:t>
             </a:fld>
             <a:endParaRPr lang="en-US"/>
           </a:p>
@@ -5880,7 +5880,7 @@
           <a:p>
             <a:fld id="{1B0D7840-AF73-495E-B674-C4E8BD3769FA}" type="datetimeFigureOut">
               <a:rPr lang="en-US" smtClean="0"/>
-              <a:t>12/7/17</a:t>
+              <a:t>12/8/17</a:t>
             </a:fld>
             <a:endParaRPr lang="en-US"/>
           </a:p>
@@ -6744,7 +6744,7 @@
   <p:timing>
     <p:tnLst>
       <p:par>
-        <p:cTn xmlns:p14="http://schemas.microsoft.com/office/powerpoint/2010/main" id="1" dur="indefinite" restart="never" nodeType="tmRoot"/>
+        <p:cTn id="1" dur="indefinite" restart="never" nodeType="tmRoot"/>
       </p:par>
     </p:tnLst>
   </p:timing>
@@ -7181,7 +7181,7 @@
   <p:timing>
     <p:tnLst>
       <p:par>
-        <p:cTn xmlns:p14="http://schemas.microsoft.com/office/powerpoint/2010/main" id="1" dur="indefinite" restart="never" nodeType="tmRoot">
+        <p:cTn id="1" dur="indefinite" restart="never" nodeType="tmRoot">
           <p:childTnLst>
             <p:seq concurrent="1" nextAc="seek">
               <p:cTn id="2" dur="indefinite" nodeType="mainSeq">
@@ -7890,7 +7890,7 @@
   <p:timing>
     <p:tnLst>
       <p:par>
-        <p:cTn xmlns:p14="http://schemas.microsoft.com/office/powerpoint/2010/main" id="1" dur="indefinite" restart="never" nodeType="tmRoot"/>
+        <p:cTn id="1" dur="indefinite" restart="never" nodeType="tmRoot"/>
       </p:par>
     </p:tnLst>
   </p:timing>
@@ -8018,7 +8018,7 @@
   <p:timing>
     <p:tnLst>
       <p:par>
-        <p:cTn xmlns:p14="http://schemas.microsoft.com/office/powerpoint/2010/main" id="1" dur="indefinite" restart="never" nodeType="tmRoot"/>
+        <p:cTn id="1" dur="indefinite" restart="never" nodeType="tmRoot"/>
       </p:par>
     </p:tnLst>
   </p:timing>
@@ -8133,7 +8133,7 @@
   <p:timing>
     <p:tnLst>
       <p:par>
-        <p:cTn xmlns:p14="http://schemas.microsoft.com/office/powerpoint/2010/main" id="1" dur="indefinite" restart="never" nodeType="tmRoot"/>
+        <p:cTn id="1" dur="indefinite" restart="never" nodeType="tmRoot"/>
       </p:par>
     </p:tnLst>
   </p:timing>
@@ -9794,7 +9794,7 @@
   <p:timing>
     <p:tnLst>
       <p:par>
-        <p:cTn xmlns:p14="http://schemas.microsoft.com/office/powerpoint/2010/main" id="1" dur="indefinite" restart="never" nodeType="tmRoot">
+        <p:cTn id="1" dur="indefinite" restart="never" nodeType="tmRoot">
           <p:childTnLst>
             <p:seq concurrent="1" nextAc="seek">
               <p:cTn id="2" dur="indefinite" nodeType="mainSeq">
@@ -10588,6 +10588,14 @@
           <a:bodyPr/>
           <a:lstStyle/>
           <a:p>
+            <a:r>
+              <a:rPr lang="en-US" dirty="0" smtClean="0"/>
+              <a:t>Do </a:t>
+            </a:r>
+            <a:r>
+              <a:rPr lang="en-US" smtClean="0"/>
+              <a:t>we still want to do this part?</a:t>
+            </a:r>
             <a:endParaRPr lang="en-US"/>
           </a:p>
         </p:txBody>
@@ -10736,11 +10744,7 @@
             </a:r>
             <a:r>
               <a:rPr lang="en-US" dirty="0" smtClean="0"/>
-              <a:t> needed an older version of Python, so we tried to learn virtual environments, but we gave up and simply uninstalled Python3 in favor of 2.7</a:t>
-            </a:r>
-            <a:r>
-              <a:rPr lang="en-US" dirty="0" smtClean="0"/>
-              <a:t>…</a:t>
+              <a:t> needed an older version of Python, so we tried to learn virtual environments, but we gave up and simply uninstalled Python3 in favor of 2.7…</a:t>
             </a:r>
           </a:p>
           <a:p>
@@ -10761,7 +10765,6 @@
               <a:rPr lang="en-US" dirty="0" smtClean="0"/>
               <a:t> figure was “backwards”</a:t>
             </a:r>
-            <a:endParaRPr lang="en-US" dirty="0" smtClean="0"/>
           </a:p>
           <a:p>
             <a:r>
@@ -10773,11 +10776,7 @@
             <a:pPr lvl="1"/>
             <a:r>
               <a:rPr lang="en-US" dirty="0" smtClean="0"/>
-              <a:t>Difficult to find out that we needed to change NA values to 0 in order to have our abundance table recognized</a:t>
-            </a:r>
-            <a:r>
-              <a:rPr lang="en-US" dirty="0" smtClean="0"/>
-              <a:t>.</a:t>
+              <a:t>Difficult to find out that we needed to change NA values to 0 in order to have our abundance table recognized.</a:t>
             </a:r>
           </a:p>
           <a:p>
@@ -10807,7 +10806,7 @@
   <p:timing>
     <p:tnLst>
       <p:par>
-        <p:cTn xmlns:p14="http://schemas.microsoft.com/office/powerpoint/2010/main" id="1" dur="indefinite" restart="never" nodeType="tmRoot"/>
+        <p:cTn id="1" dur="indefinite" restart="never" nodeType="tmRoot"/>
       </p:par>
     </p:tnLst>
   </p:timing>
@@ -10977,7 +10976,7 @@
   <p:timing>
     <p:tnLst>
       <p:par>
-        <p:cTn xmlns:p14="http://schemas.microsoft.com/office/powerpoint/2010/main" id="1" dur="indefinite" restart="never" nodeType="tmRoot"/>
+        <p:cTn id="1" dur="indefinite" restart="never" nodeType="tmRoot"/>
       </p:par>
     </p:tnLst>
   </p:timing>
@@ -11038,7 +11037,7 @@
   <p:timing>
     <p:tnLst>
       <p:par>
-        <p:cTn xmlns:p14="http://schemas.microsoft.com/office/powerpoint/2010/main" id="1" dur="indefinite" restart="never" nodeType="tmRoot"/>
+        <p:cTn id="1" dur="indefinite" restart="never" nodeType="tmRoot"/>
       </p:par>
     </p:tnLst>
   </p:timing>
@@ -11192,11 +11191,7 @@
           <a:p>
             <a:r>
               <a:rPr lang="en-US" sz="1200" dirty="0" smtClean="0"/>
-              <a:t>Environmental Samples </a:t>
-            </a:r>
-            <a:r>
-              <a:rPr lang="en-US" sz="1200" dirty="0" smtClean="0"/>
-              <a:t>(Metro air)</a:t>
+              <a:t>Environmental Samples (Metro air)</a:t>
             </a:r>
             <a:endParaRPr lang="en-US" sz="1200" dirty="0"/>
           </a:p>
@@ -11257,15 +11252,7 @@
             <a:pPr algn="ctr"/>
             <a:r>
               <a:rPr lang="en-US" sz="1200" dirty="0" smtClean="0"/>
-              <a:t>Hospital </a:t>
-            </a:r>
-            <a:r>
-              <a:rPr lang="en-US" sz="1200" dirty="0" smtClean="0"/>
-              <a:t>6 </a:t>
-            </a:r>
-            <a:r>
-              <a:rPr lang="en-US" sz="1200" dirty="0" smtClean="0"/>
-              <a:t>(Banknote)</a:t>
+              <a:t>Hospital 6 (Banknote)</a:t>
             </a:r>
             <a:endParaRPr lang="en-US" sz="1200" dirty="0"/>
           </a:p>
@@ -11314,7 +11301,7 @@
   <p:timing>
     <p:tnLst>
       <p:par>
-        <p:cTn xmlns:p14="http://schemas.microsoft.com/office/powerpoint/2010/main" id="1" dur="indefinite" restart="never" nodeType="tmRoot"/>
+        <p:cTn id="1" dur="indefinite" restart="never" nodeType="tmRoot"/>
       </p:par>
     </p:tnLst>
   </p:timing>
@@ -11572,7 +11559,7 @@
   <a:extraClrSchemeLst/>
   <a:extLst>
     <a:ext uri="{05A4C25C-085E-4340-85A3-A5531E510DB2}">
-      <thm15:themeFamily xmlns:thm15="http://schemas.microsoft.com/office/thememl/2012/main" xmlns="" name="Facet" id="{C0C680CD-088A-49FC-A102-D699147F32B2}" vid="{CFBC31BA-B70F-4F30-BCAA-4F3011E16C4D}"/>
+      <thm15:themeFamily xmlns:thm15="http://schemas.microsoft.com/office/thememl/2012/main" name="Facet" id="{C0C680CD-088A-49FC-A102-D699147F32B2}" vid="{CFBC31BA-B70F-4F30-BCAA-4F3011E16C4D}"/>
     </a:ext>
   </a:extLst>
 </a:theme>
@@ -11833,7 +11820,7 @@
   <a:extraClrSchemeLst/>
   <a:extLst>
     <a:ext uri="{05A4C25C-085E-4340-85A3-A5531E510DB2}">
-      <thm15:themeFamily xmlns:thm15="http://schemas.microsoft.com/office/thememl/2012/main" xmlns="" name="Office Theme" id="{62F939B6-93AF-4DB8-9C6B-D6C7DFDC589F}" vid="{4A3C46E8-61CC-4603-A589-7422A47A8E4A}"/>
+      <thm15:themeFamily xmlns:thm15="http://schemas.microsoft.com/office/thememl/2012/main" name="Office Theme" id="{62F939B6-93AF-4DB8-9C6B-D6C7DFDC589F}" vid="{4A3C46E8-61CC-4603-A589-7422A47A8E4A}"/>
     </a:ext>
   </a:extLst>
 </a:theme>

</xml_diff>